<commit_message>
testing and small changes
</commit_message>
<xml_diff>
--- a/Fake-news-detection.pptx
+++ b/Fake-news-detection.pptx
@@ -29,15 +29,11 @@
       <p:boldItalic r:id="rId17"/>
     </p:embeddedFont>
     <p:embeddedFont>
-      <p:font typeface="DM Sans Bold" charset="0"/>
+      <p:font typeface="Calibri" pitchFamily="34" charset="0"/>
       <p:regular r:id="rId18"/>
-    </p:embeddedFont>
-    <p:embeddedFont>
-      <p:font typeface="Calibri" pitchFamily="34" charset="0"/>
-      <p:regular r:id="rId19"/>
-      <p:bold r:id="rId20"/>
-      <p:italic r:id="rId21"/>
-      <p:boldItalic r:id="rId22"/>
+      <p:bold r:id="rId19"/>
+      <p:italic r:id="rId20"/>
+      <p:boldItalic r:id="rId21"/>
     </p:embeddedFont>
   </p:embeddedFontLst>
   <p:defaultTextStyle>
@@ -320,7 +316,7 @@
             <a:fld id="{1D8BD707-D9CF-40AE-B4C6-C98DA3205C09}" type="datetimeFigureOut">
               <a:rPr lang="en-US" smtClean="0"/>
               <a:pPr/>
-              <a:t>01-Jul-24</a:t>
+              <a:t>03-Jul-24</a:t>
             </a:fld>
             <a:endParaRPr lang="en-US"/>
           </a:p>
@@ -487,7 +483,7 @@
             <a:fld id="{1D8BD707-D9CF-40AE-B4C6-C98DA3205C09}" type="datetimeFigureOut">
               <a:rPr lang="en-US" smtClean="0"/>
               <a:pPr/>
-              <a:t>01-Jul-24</a:t>
+              <a:t>03-Jul-24</a:t>
             </a:fld>
             <a:endParaRPr lang="en-US"/>
           </a:p>
@@ -664,7 +660,7 @@
             <a:fld id="{1D8BD707-D9CF-40AE-B4C6-C98DA3205C09}" type="datetimeFigureOut">
               <a:rPr lang="en-US" smtClean="0"/>
               <a:pPr/>
-              <a:t>01-Jul-24</a:t>
+              <a:t>03-Jul-24</a:t>
             </a:fld>
             <a:endParaRPr lang="en-US"/>
           </a:p>
@@ -831,7 +827,7 @@
             <a:fld id="{1D8BD707-D9CF-40AE-B4C6-C98DA3205C09}" type="datetimeFigureOut">
               <a:rPr lang="en-US" smtClean="0"/>
               <a:pPr/>
-              <a:t>01-Jul-24</a:t>
+              <a:t>03-Jul-24</a:t>
             </a:fld>
             <a:endParaRPr lang="en-US"/>
           </a:p>
@@ -1074,7 +1070,7 @@
             <a:fld id="{1D8BD707-D9CF-40AE-B4C6-C98DA3205C09}" type="datetimeFigureOut">
               <a:rPr lang="en-US" smtClean="0"/>
               <a:pPr/>
-              <a:t>01-Jul-24</a:t>
+              <a:t>03-Jul-24</a:t>
             </a:fld>
             <a:endParaRPr lang="en-US"/>
           </a:p>
@@ -1359,7 +1355,7 @@
             <a:fld id="{1D8BD707-D9CF-40AE-B4C6-C98DA3205C09}" type="datetimeFigureOut">
               <a:rPr lang="en-US" smtClean="0"/>
               <a:pPr/>
-              <a:t>01-Jul-24</a:t>
+              <a:t>03-Jul-24</a:t>
             </a:fld>
             <a:endParaRPr lang="en-US"/>
           </a:p>
@@ -1778,7 +1774,7 @@
             <a:fld id="{1D8BD707-D9CF-40AE-B4C6-C98DA3205C09}" type="datetimeFigureOut">
               <a:rPr lang="en-US" smtClean="0"/>
               <a:pPr/>
-              <a:t>01-Jul-24</a:t>
+              <a:t>03-Jul-24</a:t>
             </a:fld>
             <a:endParaRPr lang="en-US"/>
           </a:p>
@@ -1893,7 +1889,7 @@
             <a:fld id="{1D8BD707-D9CF-40AE-B4C6-C98DA3205C09}" type="datetimeFigureOut">
               <a:rPr lang="en-US" smtClean="0"/>
               <a:pPr/>
-              <a:t>01-Jul-24</a:t>
+              <a:t>03-Jul-24</a:t>
             </a:fld>
             <a:endParaRPr lang="en-US"/>
           </a:p>
@@ -1985,7 +1981,7 @@
             <a:fld id="{1D8BD707-D9CF-40AE-B4C6-C98DA3205C09}" type="datetimeFigureOut">
               <a:rPr lang="en-US" smtClean="0"/>
               <a:pPr/>
-              <a:t>01-Jul-24</a:t>
+              <a:t>03-Jul-24</a:t>
             </a:fld>
             <a:endParaRPr lang="en-US"/>
           </a:p>
@@ -2259,7 +2255,7 @@
             <a:fld id="{1D8BD707-D9CF-40AE-B4C6-C98DA3205C09}" type="datetimeFigureOut">
               <a:rPr lang="en-US" smtClean="0"/>
               <a:pPr/>
-              <a:t>01-Jul-24</a:t>
+              <a:t>03-Jul-24</a:t>
             </a:fld>
             <a:endParaRPr lang="en-US"/>
           </a:p>
@@ -2509,7 +2505,7 @@
             <a:fld id="{1D8BD707-D9CF-40AE-B4C6-C98DA3205C09}" type="datetimeFigureOut">
               <a:rPr lang="en-US" smtClean="0"/>
               <a:pPr/>
-              <a:t>01-Jul-24</a:t>
+              <a:t>03-Jul-24</a:t>
             </a:fld>
             <a:endParaRPr lang="en-US"/>
           </a:p>
@@ -2719,7 +2715,7 @@
             <a:fld id="{1D8BD707-D9CF-40AE-B4C6-C98DA3205C09}" type="datetimeFigureOut">
               <a:rPr lang="en-US" smtClean="0"/>
               <a:pPr/>
-              <a:t>01-Jul-24</a:t>
+              <a:t>03-Jul-24</a:t>
             </a:fld>
             <a:endParaRPr lang="en-US"/>
           </a:p>
@@ -3140,7 +3136,7 @@
             <a:blip r:embed="rId2">
               <a:extLst>
                 <a:ext uri="{96DAC541-7B7A-43D3-8B79-37D633B846F1}">
-                  <asvg:svgBlip xmlns="" xmlns:asvg="http://schemas.microsoft.com/office/drawing/2016/SVG/main" r:embed="rId3"/>
+                  <asvg:svgBlip xmlns:asvg="http://schemas.microsoft.com/office/drawing/2016/SVG/main" xmlns="" r:embed="rId3"/>
                 </a:ext>
               </a:extLst>
             </a:blip>
@@ -3300,7 +3296,7 @@
             <a:blip r:embed="rId4">
               <a:extLst>
                 <a:ext uri="{96DAC541-7B7A-43D3-8B79-37D633B846F1}">
-                  <asvg:svgBlip xmlns="" xmlns:asvg="http://schemas.microsoft.com/office/drawing/2016/SVG/main" r:embed="rId7"/>
+                  <asvg:svgBlip xmlns:asvg="http://schemas.microsoft.com/office/drawing/2016/SVG/main" xmlns="" r:embed="rId7"/>
                 </a:ext>
               </a:extLst>
             </a:blip>
@@ -3352,7 +3348,7 @@
             <a:blip r:embed="rId8">
               <a:extLst>
                 <a:ext uri="{96DAC541-7B7A-43D3-8B79-37D633B846F1}">
-                  <asvg:svgBlip xmlns="" xmlns:asvg="http://schemas.microsoft.com/office/drawing/2016/SVG/main" r:embed="rId9"/>
+                  <asvg:svgBlip xmlns:asvg="http://schemas.microsoft.com/office/drawing/2016/SVG/main" xmlns="" r:embed="rId9"/>
                 </a:ext>
               </a:extLst>
             </a:blip>
@@ -3404,7 +3400,7 @@
             <a:blip r:embed="rId10">
               <a:extLst>
                 <a:ext uri="{96DAC541-7B7A-43D3-8B79-37D633B846F1}">
-                  <asvg:svgBlip xmlns="" xmlns:asvg="http://schemas.microsoft.com/office/drawing/2016/SVG/main" r:embed="rId11"/>
+                  <asvg:svgBlip xmlns:asvg="http://schemas.microsoft.com/office/drawing/2016/SVG/main" xmlns="" r:embed="rId11"/>
                 </a:ext>
               </a:extLst>
             </a:blip>
@@ -3441,37 +3437,41 @@
               </a:lnSpc>
             </a:pPr>
             <a:r>
-              <a:rPr lang="en-US" sz="9200" dirty="0" err="1" smtClean="0">
+              <a:rPr lang="en-US" sz="9200" b="1" dirty="0" err="1" smtClean="0">
                 <a:solidFill>
                   <a:srgbClr val="152039"/>
                 </a:solidFill>
-                <a:latin typeface="DM Sans Bold"/>
+                <a:latin typeface="Cambria" pitchFamily="18" charset="0"/>
+                <a:ea typeface="Cambria" pitchFamily="18" charset="0"/>
               </a:rPr>
               <a:t>Detekcija</a:t>
             </a:r>
             <a:r>
-              <a:rPr lang="en-US" sz="9200" dirty="0" smtClean="0">
+              <a:rPr lang="en-US" sz="9200" b="1" dirty="0" smtClean="0">
                 <a:solidFill>
                   <a:srgbClr val="152039"/>
                 </a:solidFill>
-                <a:latin typeface="DM Sans Bold"/>
+                <a:latin typeface="Cambria" pitchFamily="18" charset="0"/>
+                <a:ea typeface="Cambria" pitchFamily="18" charset="0"/>
               </a:rPr>
               <a:t> la</a:t>
             </a:r>
             <a:r>
-              <a:rPr lang="sr-Latn-RS" sz="9200" dirty="0" smtClean="0">
+              <a:rPr lang="sr-Latn-RS" sz="9200" b="1" dirty="0" smtClean="0">
                 <a:solidFill>
                   <a:srgbClr val="152039"/>
                 </a:solidFill>
-                <a:latin typeface="DM Sans Bold"/>
+                <a:latin typeface="Cambria" pitchFamily="18" charset="0"/>
+                <a:ea typeface="Cambria" pitchFamily="18" charset="0"/>
               </a:rPr>
               <a:t>žnih vesti</a:t>
             </a:r>
-            <a:endParaRPr lang="en-US" sz="9200" dirty="0">
+            <a:endParaRPr lang="en-US" sz="9200" b="1" dirty="0">
               <a:solidFill>
                 <a:srgbClr val="152039"/>
               </a:solidFill>
-              <a:latin typeface="DM Sans Bold"/>
+              <a:latin typeface="Cambria" pitchFamily="18" charset="0"/>
+              <a:ea typeface="Cambria" pitchFamily="18" charset="0"/>
             </a:endParaRPr>
           </a:p>
         </p:txBody>
@@ -3484,15 +3484,15 @@
         </p:nvSpPr>
         <p:spPr>
           <a:xfrm>
-            <a:off x="1485027" y="6120525"/>
-            <a:ext cx="4904730" cy="795089"/>
+            <a:off x="1485026" y="6120525"/>
+            <a:ext cx="5601573" cy="795089"/>
           </a:xfrm>
           <a:prstGeom prst="rect">
             <a:avLst/>
           </a:prstGeom>
         </p:spPr>
         <p:txBody>
-          <a:bodyPr lIns="0" tIns="0" rIns="0" bIns="0" rtlCol="0" anchor="t">
+          <a:bodyPr wrap="square" lIns="0" tIns="0" rIns="0" bIns="0" rtlCol="0" anchor="t">
             <a:spAutoFit/>
           </a:bodyPr>
           <a:lstStyle/>
@@ -3503,19 +3503,21 @@
               </a:lnSpc>
             </a:pPr>
             <a:r>
-              <a:rPr lang="sr-Latn-RS" sz="2200" dirty="0" smtClean="0">
+              <a:rPr lang="sr-Latn-RS" sz="2800" dirty="0" smtClean="0">
                 <a:solidFill>
                   <a:srgbClr val="152039"/>
                 </a:solidFill>
-                <a:latin typeface="Telegraf"/>
+                <a:latin typeface="Cambria" pitchFamily="18" charset="0"/>
+                <a:ea typeface="Cambria" pitchFamily="18" charset="0"/>
               </a:rPr>
               <a:t>Projekat iz predmeta računarska inteligencija</a:t>
             </a:r>
-            <a:endParaRPr lang="en-US" sz="2200" dirty="0">
+            <a:endParaRPr lang="en-US" sz="2800" dirty="0">
               <a:solidFill>
                 <a:srgbClr val="152039"/>
               </a:solidFill>
-              <a:latin typeface="Telegraf"/>
+              <a:latin typeface="Cambria" pitchFamily="18" charset="0"/>
+              <a:ea typeface="Cambria" pitchFamily="18" charset="0"/>
             </a:endParaRPr>
           </a:p>
         </p:txBody>
@@ -3617,19 +3619,21 @@
               </a:lnSpc>
             </a:pPr>
             <a:r>
-              <a:rPr lang="sr-Latn-RS" sz="6999" dirty="0" smtClean="0">
+              <a:rPr lang="sr-Latn-RS" sz="7200" b="1" dirty="0" smtClean="0">
                 <a:solidFill>
                   <a:srgbClr val="152039"/>
                 </a:solidFill>
-                <a:latin typeface="DM Sans Bold"/>
+                <a:latin typeface="Cambria" pitchFamily="18" charset="0"/>
+                <a:ea typeface="Cambria" pitchFamily="18" charset="0"/>
               </a:rPr>
               <a:t>Rezultati</a:t>
             </a:r>
-            <a:endParaRPr lang="en-US" sz="6999" dirty="0">
+            <a:endParaRPr lang="en-US" sz="6999" b="1" dirty="0">
               <a:solidFill>
                 <a:srgbClr val="152039"/>
               </a:solidFill>
-              <a:latin typeface="DM Sans Bold"/>
+              <a:latin typeface="Cambria" pitchFamily="18" charset="0"/>
+              <a:ea typeface="Cambria" pitchFamily="18" charset="0"/>
             </a:endParaRPr>
           </a:p>
         </p:txBody>
@@ -3676,7 +3680,7 @@
             <a:blip r:embed="rId2">
               <a:extLst>
                 <a:ext uri="{96DAC541-7B7A-43D3-8B79-37D633B846F1}">
-                  <asvg:svgBlip xmlns="" xmlns:asvg="http://schemas.microsoft.com/office/drawing/2016/SVG/main" r:embed="rId7"/>
+                  <asvg:svgBlip xmlns:asvg="http://schemas.microsoft.com/office/drawing/2016/SVG/main" xmlns="" r:embed="rId7"/>
                 </a:ext>
               </a:extLst>
             </a:blip>
@@ -3728,7 +3732,7 @@
             <a:blip r:embed="rId8">
               <a:extLst>
                 <a:ext uri="{96DAC541-7B7A-43D3-8B79-37D633B846F1}">
-                  <asvg:svgBlip xmlns="" xmlns:asvg="http://schemas.microsoft.com/office/drawing/2016/SVG/main" r:embed="rId3"/>
+                  <asvg:svgBlip xmlns:asvg="http://schemas.microsoft.com/office/drawing/2016/SVG/main" xmlns="" r:embed="rId3"/>
                 </a:ext>
               </a:extLst>
             </a:blip>
@@ -3982,10 +3986,6 @@
               </a:rPr>
               <a:t>Precision 68%</a:t>
             </a:r>
-            <a:endParaRPr lang="en-US" sz="3500" dirty="0" smtClean="0">
-              <a:latin typeface="Cambria" pitchFamily="18" charset="0"/>
-              <a:ea typeface="Cambria" pitchFamily="18" charset="0"/>
-            </a:endParaRPr>
           </a:p>
           <a:p>
             <a:pPr marL="457200" indent="-457200">
@@ -4279,13 +4279,6 @@
               </a:rPr>
               <a:t>%, recall 94%</a:t>
             </a:r>
-            <a:endParaRPr lang="sr-Latn-RS" sz="3500" dirty="0" smtClean="0">
-              <a:solidFill>
-                <a:srgbClr val="152039"/>
-              </a:solidFill>
-              <a:latin typeface="Cambria" pitchFamily="18" charset="0"/>
-              <a:ea typeface="Cambria" pitchFamily="18" charset="0"/>
-            </a:endParaRPr>
           </a:p>
           <a:p>
             <a:pPr marL="914400" lvl="1" indent="-457200">
@@ -4584,13 +4577,15 @@
               </a:lnSpc>
             </a:pPr>
             <a:r>
-              <a:rPr lang="sr-Latn-RS" sz="6999" dirty="0" smtClean="0">
-                <a:latin typeface="DM Sans Bold"/>
+              <a:rPr lang="sr-Latn-RS" sz="7200" b="1" dirty="0" smtClean="0">
+                <a:latin typeface="Cambria" pitchFamily="18" charset="0"/>
+                <a:ea typeface="Cambria" pitchFamily="18" charset="0"/>
               </a:rPr>
               <a:t>Zaključak</a:t>
             </a:r>
-            <a:endParaRPr lang="en-US" sz="6999" dirty="0">
-              <a:latin typeface="DM Sans Bold"/>
+            <a:endParaRPr lang="en-US" sz="7200" b="1" dirty="0">
+              <a:latin typeface="Cambria" pitchFamily="18" charset="0"/>
+              <a:ea typeface="Cambria" pitchFamily="18" charset="0"/>
             </a:endParaRPr>
           </a:p>
         </p:txBody>
@@ -4603,8 +4598,8 @@
         </p:nvSpPr>
         <p:spPr>
           <a:xfrm>
-            <a:off x="18393" y="1790700"/>
-            <a:ext cx="18367267" cy="8094524"/>
+            <a:off x="-3067" y="1854785"/>
+            <a:ext cx="18138667" cy="8094524"/>
           </a:xfrm>
           <a:prstGeom prst="rect">
             <a:avLst/>
@@ -5674,70 +5669,14 @@
               <a:t> </a:t>
             </a:r>
             <a:r>
-              <a:rPr lang="en-US" sz="3500" dirty="0" err="1">
-                <a:latin typeface="Cambria" pitchFamily="18" charset="0"/>
-                <a:ea typeface="Cambria" pitchFamily="18" charset="0"/>
-              </a:rPr>
-              <a:t>performanse</a:t>
-            </a:r>
-            <a:r>
-              <a:rPr lang="en-US" sz="3500" dirty="0">
-                <a:latin typeface="Cambria" pitchFamily="18" charset="0"/>
-                <a:ea typeface="Cambria" pitchFamily="18" charset="0"/>
-              </a:rPr>
-              <a:t> </a:t>
-            </a:r>
-            <a:r>
-              <a:rPr lang="en-US" sz="3500" dirty="0" err="1">
-                <a:latin typeface="Cambria" pitchFamily="18" charset="0"/>
-                <a:ea typeface="Cambria" pitchFamily="18" charset="0"/>
-              </a:rPr>
-              <a:t>za</a:t>
-            </a:r>
-            <a:r>
-              <a:rPr lang="en-US" sz="3500" dirty="0">
-                <a:latin typeface="Cambria" pitchFamily="18" charset="0"/>
-                <a:ea typeface="Cambria" pitchFamily="18" charset="0"/>
-              </a:rPr>
-              <a:t> </a:t>
-            </a:r>
-            <a:r>
-              <a:rPr lang="en-US" sz="3500" dirty="0" err="1">
-                <a:latin typeface="Cambria" pitchFamily="18" charset="0"/>
-                <a:ea typeface="Cambria" pitchFamily="18" charset="0"/>
-              </a:rPr>
-              <a:t>ovaj</a:t>
-            </a:r>
-            <a:r>
-              <a:rPr lang="en-US" sz="3500" dirty="0">
-                <a:latin typeface="Cambria" pitchFamily="18" charset="0"/>
-                <a:ea typeface="Cambria" pitchFamily="18" charset="0"/>
-              </a:rPr>
-              <a:t> </a:t>
-            </a:r>
-            <a:r>
-              <a:rPr lang="en-US" sz="3500" dirty="0" err="1">
-                <a:latin typeface="Cambria" pitchFamily="18" charset="0"/>
-                <a:ea typeface="Cambria" pitchFamily="18" charset="0"/>
-              </a:rPr>
-              <a:t>specifičan</a:t>
-            </a:r>
-            <a:r>
-              <a:rPr lang="en-US" sz="3500" dirty="0">
-                <a:latin typeface="Cambria" pitchFamily="18" charset="0"/>
-                <a:ea typeface="Cambria" pitchFamily="18" charset="0"/>
-              </a:rPr>
-              <a:t> </a:t>
-            </a:r>
-            <a:r>
-              <a:rPr lang="en-US" sz="3500" dirty="0" err="1">
-                <a:latin typeface="Cambria" pitchFamily="18" charset="0"/>
-                <a:ea typeface="Cambria" pitchFamily="18" charset="0"/>
-              </a:rPr>
-              <a:t>zadatak</a:t>
-            </a:r>
-            <a:r>
-              <a:rPr lang="en-US" sz="3500" dirty="0">
+              <a:rPr lang="en-US" sz="3500" dirty="0" err="1" smtClean="0">
+                <a:latin typeface="Cambria" pitchFamily="18" charset="0"/>
+                <a:ea typeface="Cambria" pitchFamily="18" charset="0"/>
+              </a:rPr>
+              <a:t>rezultate</a:t>
+            </a:r>
+            <a:r>
+              <a:rPr lang="en-US" sz="3500" dirty="0" smtClean="0">
                 <a:latin typeface="Cambria" pitchFamily="18" charset="0"/>
                 <a:ea typeface="Cambria" pitchFamily="18" charset="0"/>
               </a:rPr>
@@ -5873,7 +5812,35 @@
                 <a:latin typeface="Cambria" pitchFamily="18" charset="0"/>
                 <a:ea typeface="Cambria" pitchFamily="18" charset="0"/>
               </a:rPr>
-              <a:t> isporobvanjem različitih arhitektura modela (različite vrste slojeva i vrednosti parametara). Takođe postoji mogućnost </a:t>
+              <a:t> </a:t>
+            </a:r>
+            <a:r>
+              <a:rPr lang="sr-Latn-RS" sz="3500" dirty="0" smtClean="0">
+                <a:latin typeface="Cambria" pitchFamily="18" charset="0"/>
+                <a:ea typeface="Cambria" pitchFamily="18" charset="0"/>
+              </a:rPr>
+              <a:t>isprob</a:t>
+            </a:r>
+            <a:r>
+              <a:rPr lang="en-US" sz="3500" dirty="0" smtClean="0">
+                <a:latin typeface="Cambria" pitchFamily="18" charset="0"/>
+                <a:ea typeface="Cambria" pitchFamily="18" charset="0"/>
+              </a:rPr>
+              <a:t>a</a:t>
+            </a:r>
+            <a:r>
+              <a:rPr lang="sr-Latn-RS" sz="3500" dirty="0" smtClean="0">
+                <a:latin typeface="Cambria" pitchFamily="18" charset="0"/>
+                <a:ea typeface="Cambria" pitchFamily="18" charset="0"/>
+              </a:rPr>
+              <a:t>vanjem </a:t>
+            </a:r>
+            <a:r>
+              <a:rPr lang="sr-Latn-RS" sz="3500" dirty="0" smtClean="0">
+                <a:latin typeface="Cambria" pitchFamily="18" charset="0"/>
+                <a:ea typeface="Cambria" pitchFamily="18" charset="0"/>
+              </a:rPr>
+              <a:t>različitih arhitektura modela (različite vrste slojeva i vrednosti parametara). Takođe postoji mogućnost </a:t>
             </a:r>
             <a:r>
               <a:rPr lang="sr-Latn-RS" sz="3500" dirty="0">
@@ -5915,20 +5882,20 @@
                 <a:latin typeface="Cambria" pitchFamily="18" charset="0"/>
                 <a:ea typeface="Cambria" pitchFamily="18" charset="0"/>
               </a:rPr>
-              <a:t>reprocesiranja</a:t>
-            </a:r>
-            <a:r>
-              <a:rPr lang="sr-Latn-RS" sz="3500" dirty="0">
-                <a:latin typeface="Cambria" pitchFamily="18" charset="0"/>
-                <a:ea typeface="Cambria" pitchFamily="18" charset="0"/>
-              </a:rPr>
-              <a:t> </a:t>
+              <a:t>retprocesiranja</a:t>
             </a:r>
             <a:r>
               <a:rPr lang="sr-Latn-RS" sz="3500" dirty="0" smtClean="0">
                 <a:latin typeface="Cambria" pitchFamily="18" charset="0"/>
                 <a:ea typeface="Cambria" pitchFamily="18" charset="0"/>
               </a:rPr>
+              <a:t> </a:t>
+            </a:r>
+            <a:r>
+              <a:rPr lang="sr-Latn-RS" sz="3500" dirty="0" smtClean="0">
+                <a:latin typeface="Cambria" pitchFamily="18" charset="0"/>
+                <a:ea typeface="Cambria" pitchFamily="18" charset="0"/>
+              </a:rPr>
               <a:t>korišćenjem</a:t>
             </a:r>
             <a:r>
@@ -5960,28 +5927,28 @@
               <a:t> </a:t>
             </a:r>
             <a:r>
-              <a:rPr lang="en-US" sz="3500" dirty="0" err="1">
-                <a:latin typeface="Cambria" pitchFamily="18" charset="0"/>
-                <a:ea typeface="Cambria" pitchFamily="18" charset="0"/>
-              </a:rPr>
-              <a:t>tehnike</a:t>
-            </a:r>
-            <a:r>
-              <a:rPr lang="en-US" sz="3500" dirty="0">
-                <a:latin typeface="Cambria" pitchFamily="18" charset="0"/>
-                <a:ea typeface="Cambria" pitchFamily="18" charset="0"/>
-              </a:rPr>
-              <a:t> </a:t>
-            </a:r>
-            <a:r>
-              <a:rPr lang="en-US" sz="3500" dirty="0" err="1">
-                <a:latin typeface="Cambria" pitchFamily="18" charset="0"/>
-                <a:ea typeface="Cambria" pitchFamily="18" charset="0"/>
-              </a:rPr>
-              <a:t>preprocesiranja</a:t>
-            </a:r>
-            <a:r>
-              <a:rPr lang="en-US" sz="3500" dirty="0">
+              <a:rPr lang="en-US" sz="3500" dirty="0" err="1" smtClean="0">
+                <a:latin typeface="Cambria" pitchFamily="18" charset="0"/>
+                <a:ea typeface="Cambria" pitchFamily="18" charset="0"/>
+              </a:rPr>
+              <a:t>tehnika</a:t>
+            </a:r>
+            <a:r>
+              <a:rPr lang="en-US" sz="3500" dirty="0" smtClean="0">
+                <a:latin typeface="Cambria" pitchFamily="18" charset="0"/>
+                <a:ea typeface="Cambria" pitchFamily="18" charset="0"/>
+              </a:rPr>
+              <a:t> </a:t>
+            </a:r>
+            <a:r>
+              <a:rPr lang="en-US" sz="3500" dirty="0" err="1" smtClean="0">
+                <a:latin typeface="Cambria" pitchFamily="18" charset="0"/>
+                <a:ea typeface="Cambria" pitchFamily="18" charset="0"/>
+              </a:rPr>
+              <a:t>pretprocesiranja</a:t>
+            </a:r>
+            <a:r>
+              <a:rPr lang="en-US" sz="3500" dirty="0" smtClean="0">
                 <a:latin typeface="Cambria" pitchFamily="18" charset="0"/>
                 <a:ea typeface="Cambria" pitchFamily="18" charset="0"/>
               </a:rPr>
@@ -6239,7 +6206,7 @@
             <a:blip r:embed="rId2">
               <a:extLst>
                 <a:ext uri="{96DAC541-7B7A-43D3-8B79-37D633B846F1}">
-                  <asvg:svgBlip xmlns="" xmlns:asvg="http://schemas.microsoft.com/office/drawing/2016/SVG/main" r:embed="rId11"/>
+                  <asvg:svgBlip xmlns:asvg="http://schemas.microsoft.com/office/drawing/2016/SVG/main" xmlns="" r:embed="rId11"/>
                 </a:ext>
               </a:extLst>
             </a:blip>
@@ -6444,7 +6411,7 @@
             <a:blip r:embed="rId2">
               <a:extLst>
                 <a:ext uri="{96DAC541-7B7A-43D3-8B79-37D633B846F1}">
-                  <asvg:svgBlip xmlns="" xmlns:asvg="http://schemas.microsoft.com/office/drawing/2016/SVG/main" r:embed="rId6"/>
+                  <asvg:svgBlip xmlns:asvg="http://schemas.microsoft.com/office/drawing/2016/SVG/main" xmlns="" r:embed="rId6"/>
                 </a:ext>
               </a:extLst>
             </a:blip>
@@ -6462,7 +6429,7 @@
         </p:nvGrpSpPr>
         <p:grpSpPr>
           <a:xfrm>
-            <a:off x="-533400" y="6972300"/>
+            <a:off x="-1065576" y="6896100"/>
             <a:ext cx="2507456" cy="5474559"/>
             <a:chOff x="0" y="0"/>
             <a:chExt cx="660400" cy="1441859"/>
@@ -6570,7 +6537,7 @@
         </p:nvSpPr>
         <p:spPr>
           <a:xfrm>
-            <a:off x="1219200" y="723900"/>
+            <a:off x="1219200" y="1409700"/>
             <a:ext cx="4908082" cy="1091389"/>
           </a:xfrm>
           <a:prstGeom prst="rect">
@@ -6589,19 +6556,21 @@
               </a:lnSpc>
             </a:pPr>
             <a:r>
-              <a:rPr lang="sr-Latn-RS" sz="8000" dirty="0" smtClean="0">
+              <a:rPr lang="sr-Latn-RS" sz="8000" b="1" dirty="0" smtClean="0">
                 <a:solidFill>
                   <a:srgbClr val="FFFFFF"/>
                 </a:solidFill>
-                <a:latin typeface="DM Sans Bold"/>
+                <a:latin typeface="Cambria" pitchFamily="18" charset="0"/>
+                <a:ea typeface="Cambria" pitchFamily="18" charset="0"/>
               </a:rPr>
               <a:t>Naš tim</a:t>
             </a:r>
-            <a:endParaRPr lang="en-US" sz="8000" dirty="0">
+            <a:endParaRPr lang="en-US" sz="8000" b="1" dirty="0">
               <a:solidFill>
                 <a:srgbClr val="FFFFFF"/>
               </a:solidFill>
-              <a:latin typeface="DM Sans Bold"/>
+              <a:latin typeface="Cambria" pitchFamily="18" charset="0"/>
+              <a:ea typeface="Cambria" pitchFamily="18" charset="0"/>
             </a:endParaRPr>
           </a:p>
         </p:txBody>
@@ -6614,8 +6583,8 @@
         </p:nvSpPr>
         <p:spPr>
           <a:xfrm>
-            <a:off x="1192057" y="2689606"/>
-            <a:ext cx="6473180" cy="515632"/>
+            <a:off x="1192057" y="3375406"/>
+            <a:ext cx="6473180" cy="532582"/>
           </a:xfrm>
           <a:prstGeom prst="rect">
             <a:avLst/>
@@ -6633,19 +6602,41 @@
               </a:lnSpc>
             </a:pPr>
             <a:r>
-              <a:rPr lang="sr-Latn-RS" sz="4400" dirty="0" smtClean="0">
+              <a:rPr lang="sr-Latn-RS" sz="5400" dirty="0" smtClean="0">
                 <a:solidFill>
                   <a:srgbClr val="FFE34F"/>
                 </a:solidFill>
-                <a:latin typeface="DM Sans Bold"/>
-              </a:rPr>
-              <a:t>Valentina Jevtić</a:t>
-            </a:r>
-            <a:endParaRPr lang="en-US" sz="4400" dirty="0">
+                <a:latin typeface="Cambria" pitchFamily="18" charset="0"/>
+                <a:ea typeface="Cambria" pitchFamily="18" charset="0"/>
+              </a:rPr>
+              <a:t>Valentina</a:t>
+            </a:r>
+            <a:r>
+              <a:rPr lang="en-US" sz="5400" dirty="0" smtClean="0">
+                <a:solidFill>
+                  <a:srgbClr val="FFE34F"/>
+                </a:solidFill>
+                <a:latin typeface="Cambria" pitchFamily="18" charset="0"/>
+                <a:ea typeface="Cambria" pitchFamily="18" charset="0"/>
+              </a:rPr>
+              <a:t> </a:t>
+            </a:r>
+            <a:r>
+              <a:rPr lang="sr-Latn-RS" sz="5400" dirty="0" smtClean="0">
+                <a:solidFill>
+                  <a:srgbClr val="FFE34F"/>
+                </a:solidFill>
+                <a:latin typeface="Cambria" pitchFamily="18" charset="0"/>
+                <a:ea typeface="Cambria" pitchFamily="18" charset="0"/>
+              </a:rPr>
+              <a:t>Jevtić</a:t>
+            </a:r>
+            <a:endParaRPr lang="en-US" sz="5400" dirty="0">
               <a:solidFill>
                 <a:srgbClr val="FFE34F"/>
               </a:solidFill>
-              <a:latin typeface="DM Sans Bold"/>
+              <a:latin typeface="Cambria" pitchFamily="18" charset="0"/>
+              <a:ea typeface="Cambria" pitchFamily="18" charset="0"/>
             </a:endParaRPr>
           </a:p>
         </p:txBody>
@@ -6658,8 +6649,8 @@
         </p:nvSpPr>
         <p:spPr>
           <a:xfrm>
-            <a:off x="6248401" y="2714239"/>
-            <a:ext cx="4953001" cy="515632"/>
+            <a:off x="6248401" y="3400039"/>
+            <a:ext cx="4038599" cy="532582"/>
           </a:xfrm>
           <a:prstGeom prst="rect">
             <a:avLst/>
@@ -6677,28 +6668,21 @@
               </a:lnSpc>
             </a:pPr>
             <a:r>
-              <a:rPr lang="sr-Latn-RS" sz="4400" dirty="0" smtClean="0">
+              <a:rPr lang="sr-Latn-RS" sz="5400" dirty="0" smtClean="0">
                 <a:solidFill>
                   <a:srgbClr val="FFE34F"/>
                 </a:solidFill>
-                <a:latin typeface="DM Sans Bold"/>
-              </a:rPr>
-              <a:t>Sonja </a:t>
-            </a:r>
-            <a:r>
-              <a:rPr lang="sr-Latn-RS" sz="4400" dirty="0" smtClean="0">
-                <a:solidFill>
-                  <a:srgbClr val="FFE34F"/>
-                </a:solidFill>
-                <a:latin typeface="DM Sans Bold"/>
-              </a:rPr>
-              <a:t>Baljicki</a:t>
-            </a:r>
-            <a:endParaRPr lang="en-US" sz="4400" dirty="0">
+                <a:latin typeface="Cambria" pitchFamily="18" charset="0"/>
+                <a:ea typeface="Cambria" pitchFamily="18" charset="0"/>
+              </a:rPr>
+              <a:t>Sonja Baljicki</a:t>
+            </a:r>
+            <a:endParaRPr lang="en-US" sz="5400" dirty="0">
               <a:solidFill>
                 <a:srgbClr val="FFE34F"/>
               </a:solidFill>
-              <a:latin typeface="DM Sans Bold"/>
+              <a:latin typeface="Cambria" pitchFamily="18" charset="0"/>
+              <a:ea typeface="Cambria" pitchFamily="18" charset="0"/>
             </a:endParaRPr>
           </a:p>
         </p:txBody>
@@ -6711,8 +6695,8 @@
         </p:nvSpPr>
         <p:spPr>
           <a:xfrm>
-            <a:off x="1219200" y="3180779"/>
-            <a:ext cx="4953001" cy="819722"/>
+            <a:off x="1219200" y="3983955"/>
+            <a:ext cx="4953001" cy="403187"/>
           </a:xfrm>
           <a:prstGeom prst="rect">
             <a:avLst/>
@@ -6730,36 +6714,21 @@
               </a:lnSpc>
             </a:pPr>
             <a:r>
-              <a:rPr lang="en-US" sz="3200" dirty="0" smtClean="0">
+              <a:rPr lang="en-US" sz="3600" dirty="0" smtClean="0">
                 <a:solidFill>
                   <a:srgbClr val="FFFFFF"/>
                 </a:solidFill>
-                <a:latin typeface="Telegraf"/>
-              </a:rPr>
-              <a:t>Student</a:t>
-            </a:r>
-            <a:br>
-              <a:rPr lang="en-US" sz="3200" dirty="0" smtClean="0">
-                <a:solidFill>
-                  <a:srgbClr val="FFFFFF"/>
-                </a:solidFill>
-                <a:latin typeface="Telegraf"/>
-              </a:rPr>
-            </a:br>
-            <a:r>
-              <a:rPr lang="en-US" sz="3200" dirty="0" smtClean="0">
-                <a:solidFill>
-                  <a:srgbClr val="FFFFFF"/>
-                </a:solidFill>
-                <a:latin typeface="Telegraf"/>
+                <a:latin typeface="Cambria" pitchFamily="18" charset="0"/>
+                <a:ea typeface="Cambria" pitchFamily="18" charset="0"/>
               </a:rPr>
               <a:t>SV11/2021</a:t>
             </a:r>
-            <a:endParaRPr lang="en-US" sz="3200" dirty="0">
+            <a:endParaRPr lang="en-US" sz="3600" dirty="0">
               <a:solidFill>
                 <a:srgbClr val="FFFFFF"/>
               </a:solidFill>
-              <a:latin typeface="Telegraf"/>
+              <a:latin typeface="Cambria" pitchFamily="18" charset="0"/>
+              <a:ea typeface="Cambria" pitchFamily="18" charset="0"/>
             </a:endParaRPr>
           </a:p>
         </p:txBody>
@@ -6772,8 +6741,8 @@
         </p:nvSpPr>
         <p:spPr>
           <a:xfrm>
-            <a:off x="6248400" y="3205238"/>
-            <a:ext cx="4953001" cy="819722"/>
+            <a:off x="6248401" y="4000500"/>
+            <a:ext cx="3429000" cy="403187"/>
           </a:xfrm>
           <a:prstGeom prst="rect">
             <a:avLst/>
@@ -6791,45 +6760,31 @@
               </a:lnSpc>
             </a:pPr>
             <a:r>
-              <a:rPr lang="sr-Latn-RS" sz="3200" dirty="0" smtClean="0">
+              <a:rPr lang="sr-Latn-RS" sz="3600" dirty="0" smtClean="0">
                 <a:solidFill>
                   <a:srgbClr val="FFFFFF"/>
                 </a:solidFill>
-                <a:latin typeface="Telegraf"/>
-              </a:rPr>
-              <a:t>Student </a:t>
-            </a:r>
-            <a:br>
-              <a:rPr lang="sr-Latn-RS" sz="3200" dirty="0" smtClean="0">
+                <a:latin typeface="Cambria" pitchFamily="18" charset="0"/>
+                <a:ea typeface="Cambria" pitchFamily="18" charset="0"/>
+              </a:rPr>
+              <a:t>SV59</a:t>
+            </a:r>
+            <a:r>
+              <a:rPr lang="en-US" sz="3600" dirty="0" smtClean="0">
                 <a:solidFill>
                   <a:srgbClr val="FFFFFF"/>
                 </a:solidFill>
-                <a:latin typeface="Telegraf"/>
-              </a:rPr>
-            </a:br>
-            <a:r>
-              <a:rPr lang="sr-Latn-RS" sz="3200" dirty="0" smtClean="0">
-                <a:solidFill>
-                  <a:srgbClr val="FFFFFF"/>
-                </a:solidFill>
-                <a:latin typeface="Telegraf"/>
-              </a:rPr>
-              <a:t>SV59</a:t>
-            </a:r>
-            <a:r>
-              <a:rPr lang="en-US" sz="3200" dirty="0" smtClean="0">
-                <a:solidFill>
-                  <a:srgbClr val="FFFFFF"/>
-                </a:solidFill>
-                <a:latin typeface="Telegraf"/>
+                <a:latin typeface="Cambria" pitchFamily="18" charset="0"/>
+                <a:ea typeface="Cambria" pitchFamily="18" charset="0"/>
               </a:rPr>
               <a:t>/2021</a:t>
             </a:r>
-            <a:endParaRPr lang="en-US" sz="3200" dirty="0">
+            <a:endParaRPr lang="en-US" sz="3600" dirty="0">
               <a:solidFill>
                 <a:srgbClr val="FFFFFF"/>
               </a:solidFill>
-              <a:latin typeface="Telegraf"/>
+              <a:latin typeface="Cambria" pitchFamily="18" charset="0"/>
+              <a:ea typeface="Cambria" pitchFamily="18" charset="0"/>
             </a:endParaRPr>
           </a:p>
         </p:txBody>
@@ -7016,7 +6971,7 @@
             <a:blip r:embed="rId2">
               <a:extLst>
                 <a:ext uri="{96DAC541-7B7A-43D3-8B79-37D633B846F1}">
-                  <asvg:svgBlip xmlns="" xmlns:asvg="http://schemas.microsoft.com/office/drawing/2016/SVG/main" r:embed="rId4"/>
+                  <asvg:svgBlip xmlns:asvg="http://schemas.microsoft.com/office/drawing/2016/SVG/main" xmlns="" r:embed="rId4"/>
                 </a:ext>
               </a:extLst>
             </a:blip>
@@ -7068,7 +7023,7 @@
             <a:blip r:embed="rId5">
               <a:extLst>
                 <a:ext uri="{96DAC541-7B7A-43D3-8B79-37D633B846F1}">
-                  <asvg:svgBlip xmlns="" xmlns:asvg="http://schemas.microsoft.com/office/drawing/2016/SVG/main" r:embed="rId6"/>
+                  <asvg:svgBlip xmlns:asvg="http://schemas.microsoft.com/office/drawing/2016/SVG/main" xmlns="" r:embed="rId6"/>
                 </a:ext>
               </a:extLst>
             </a:blip>
@@ -7120,7 +7075,7 @@
             <a:blip r:embed="rId7">
               <a:extLst>
                 <a:ext uri="{96DAC541-7B7A-43D3-8B79-37D633B846F1}">
-                  <asvg:svgBlip xmlns="" xmlns:asvg="http://schemas.microsoft.com/office/drawing/2016/SVG/main" r:embed="rId8"/>
+                  <asvg:svgBlip xmlns:asvg="http://schemas.microsoft.com/office/drawing/2016/SVG/main" xmlns="" r:embed="rId8"/>
                 </a:ext>
               </a:extLst>
             </a:blip>
@@ -7157,19 +7112,21 @@
               </a:lnSpc>
             </a:pPr>
             <a:r>
-              <a:rPr lang="sr-Latn-RS" sz="6999" dirty="0" smtClean="0">
+              <a:rPr lang="sr-Latn-RS" sz="7200" b="1" dirty="0" smtClean="0">
                 <a:solidFill>
                   <a:srgbClr val="152039"/>
                 </a:solidFill>
-                <a:latin typeface="DM Sans Bold"/>
+                <a:latin typeface="Cambria" pitchFamily="18" charset="0"/>
+                <a:ea typeface="Cambria" pitchFamily="18" charset="0"/>
               </a:rPr>
               <a:t>Uvod</a:t>
             </a:r>
-            <a:endParaRPr lang="en-US" sz="6999" dirty="0">
+            <a:endParaRPr lang="en-US" sz="7200" b="1" dirty="0">
               <a:solidFill>
                 <a:srgbClr val="152039"/>
               </a:solidFill>
-              <a:latin typeface="DM Sans Bold"/>
+              <a:latin typeface="Cambria" pitchFamily="18" charset="0"/>
+              <a:ea typeface="Cambria" pitchFamily="18" charset="0"/>
             </a:endParaRPr>
           </a:p>
         </p:txBody>
@@ -7316,18 +7273,25 @@
               <a:t> </a:t>
             </a:r>
             <a:r>
-              <a:rPr lang="en-US" sz="3500" dirty="0" err="1">
-                <a:latin typeface="Cambria" pitchFamily="18" charset="0"/>
-                <a:ea typeface="Cambria" pitchFamily="18" charset="0"/>
-              </a:rPr>
-              <a:t>koji</a:t>
-            </a:r>
-            <a:r>
-              <a:rPr lang="en-US" sz="3500" dirty="0">
-                <a:latin typeface="Cambria" pitchFamily="18" charset="0"/>
-                <a:ea typeface="Cambria" pitchFamily="18" charset="0"/>
-              </a:rPr>
-              <a:t> je </a:t>
+              <a:rPr lang="en-US" sz="3500" dirty="0" err="1" smtClean="0">
+                <a:latin typeface="Cambria" pitchFamily="18" charset="0"/>
+                <a:ea typeface="Cambria" pitchFamily="18" charset="0"/>
+              </a:rPr>
+              <a:t>koju</a:t>
+            </a:r>
+            <a:r>
+              <a:rPr lang="en-US" sz="3500" dirty="0" smtClean="0">
+                <a:latin typeface="Cambria" pitchFamily="18" charset="0"/>
+                <a:ea typeface="Cambria" pitchFamily="18" charset="0"/>
+              </a:rPr>
+              <a:t> </a:t>
+            </a:r>
+            <a:r>
+              <a:rPr lang="en-US" sz="3500" dirty="0">
+                <a:latin typeface="Cambria" pitchFamily="18" charset="0"/>
+                <a:ea typeface="Cambria" pitchFamily="18" charset="0"/>
+              </a:rPr>
+              <a:t>je </a:t>
             </a:r>
             <a:r>
               <a:rPr lang="en-US" sz="3500" dirty="0" err="1">
@@ -7827,7 +7791,7 @@
             <a:blip r:embed="rId2">
               <a:extLst>
                 <a:ext uri="{96DAC541-7B7A-43D3-8B79-37D633B846F1}">
-                  <asvg:svgBlip xmlns="" xmlns:asvg="http://schemas.microsoft.com/office/drawing/2016/SVG/main" r:embed="rId3"/>
+                  <asvg:svgBlip xmlns:asvg="http://schemas.microsoft.com/office/drawing/2016/SVG/main" xmlns="" r:embed="rId3"/>
                 </a:ext>
               </a:extLst>
             </a:blip>
@@ -7879,7 +7843,7 @@
             <a:blip r:embed="rId4">
               <a:extLst>
                 <a:ext uri="{96DAC541-7B7A-43D3-8B79-37D633B846F1}">
-                  <asvg:svgBlip xmlns="" xmlns:asvg="http://schemas.microsoft.com/office/drawing/2016/SVG/main" r:embed="rId5"/>
+                  <asvg:svgBlip xmlns:asvg="http://schemas.microsoft.com/office/drawing/2016/SVG/main" xmlns="" r:embed="rId5"/>
                 </a:ext>
               </a:extLst>
             </a:blip>
@@ -7931,7 +7895,7 @@
             <a:blip r:embed="rId6">
               <a:extLst>
                 <a:ext uri="{96DAC541-7B7A-43D3-8B79-37D633B846F1}">
-                  <asvg:svgBlip xmlns="" xmlns:asvg="http://schemas.microsoft.com/office/drawing/2016/SVG/main" r:embed="rId7"/>
+                  <asvg:svgBlip xmlns:asvg="http://schemas.microsoft.com/office/drawing/2016/SVG/main" xmlns="" r:embed="rId7"/>
                 </a:ext>
               </a:extLst>
             </a:blip>
@@ -7968,19 +7932,21 @@
               </a:lnSpc>
             </a:pPr>
             <a:r>
-              <a:rPr lang="sr-Latn-RS" sz="6999" dirty="0" smtClean="0">
+              <a:rPr lang="sr-Latn-RS" sz="7200" b="1" dirty="0" smtClean="0">
                 <a:solidFill>
                   <a:srgbClr val="152039"/>
                 </a:solidFill>
-                <a:latin typeface="DM Sans Bold"/>
+                <a:latin typeface="Cambria" pitchFamily="18" charset="0"/>
+                <a:ea typeface="Cambria" pitchFamily="18" charset="0"/>
               </a:rPr>
               <a:t>Skup podataka</a:t>
             </a:r>
-            <a:endParaRPr lang="en-US" sz="6999" dirty="0">
+            <a:endParaRPr lang="en-US" sz="7200" b="1" dirty="0">
               <a:solidFill>
                 <a:srgbClr val="152039"/>
               </a:solidFill>
-              <a:latin typeface="DM Sans Bold"/>
+              <a:latin typeface="Cambria" pitchFamily="18" charset="0"/>
+              <a:ea typeface="Cambria" pitchFamily="18" charset="0"/>
             </a:endParaRPr>
           </a:p>
         </p:txBody>
@@ -7993,8 +7959,8 @@
         </p:nvSpPr>
         <p:spPr>
           <a:xfrm>
-            <a:off x="374144" y="1952327"/>
-            <a:ext cx="10446256" cy="6924973"/>
+            <a:off x="228600" y="1952327"/>
+            <a:ext cx="10668000" cy="8002191"/>
           </a:xfrm>
           <a:prstGeom prst="rect">
             <a:avLst/>
@@ -8245,14 +8211,14 @@
               <a:t>, </a:t>
             </a:r>
             <a:r>
-              <a:rPr lang="en-US" sz="3500" dirty="0" err="1">
-                <a:latin typeface="Cambria" pitchFamily="18" charset="0"/>
-                <a:ea typeface="Cambria" pitchFamily="18" charset="0"/>
-              </a:rPr>
-              <a:t>autor</a:t>
-            </a:r>
-            <a:r>
-              <a:rPr lang="en-US" sz="3500" dirty="0">
+              <a:rPr lang="en-US" sz="3500" dirty="0" err="1" smtClean="0">
+                <a:latin typeface="Cambria" pitchFamily="18" charset="0"/>
+                <a:ea typeface="Cambria" pitchFamily="18" charset="0"/>
+              </a:rPr>
+              <a:t>autora</a:t>
+            </a:r>
+            <a:r>
+              <a:rPr lang="en-US" sz="3500" dirty="0" smtClean="0">
                 <a:latin typeface="Cambria" pitchFamily="18" charset="0"/>
                 <a:ea typeface="Cambria" pitchFamily="18" charset="0"/>
               </a:rPr>
@@ -8363,10 +8329,6 @@
               </a:rPr>
               <a:t>.</a:t>
             </a:r>
-            <a:endParaRPr lang="en-US" sz="3500" dirty="0" smtClean="0">
-              <a:latin typeface="Cambria" pitchFamily="18" charset="0"/>
-              <a:ea typeface="Cambria" pitchFamily="18" charset="0"/>
-            </a:endParaRPr>
           </a:p>
           <a:p>
             <a:pPr>
@@ -9044,11 +9006,137 @@
               <a:t>proveru</a:t>
             </a:r>
             <a:r>
-              <a:rPr lang="en-US" sz="3500" dirty="0">
-                <a:latin typeface="Cambria" pitchFamily="18" charset="0"/>
-                <a:ea typeface="Cambria" pitchFamily="18" charset="0"/>
-              </a:rPr>
-              <a:t>.</a:t>
+              <a:rPr lang="en-US" sz="3500" dirty="0" smtClean="0">
+                <a:latin typeface="Cambria" pitchFamily="18" charset="0"/>
+                <a:ea typeface="Cambria" pitchFamily="18" charset="0"/>
+              </a:rPr>
+              <a:t>. A </a:t>
+            </a:r>
+            <a:r>
+              <a:rPr lang="en-US" sz="3500" dirty="0" err="1" smtClean="0">
+                <a:latin typeface="Cambria" pitchFamily="18" charset="0"/>
+                <a:ea typeface="Cambria" pitchFamily="18" charset="0"/>
+              </a:rPr>
+              <a:t>kod</a:t>
+            </a:r>
+            <a:r>
+              <a:rPr lang="en-US" sz="3500" dirty="0" smtClean="0">
+                <a:latin typeface="Cambria" pitchFamily="18" charset="0"/>
+                <a:ea typeface="Cambria" pitchFamily="18" charset="0"/>
+              </a:rPr>
+              <a:t> SVM </a:t>
+            </a:r>
+            <a:r>
+              <a:rPr lang="en-US" sz="3500" dirty="0" err="1" smtClean="0">
+                <a:latin typeface="Cambria" pitchFamily="18" charset="0"/>
+                <a:ea typeface="Cambria" pitchFamily="18" charset="0"/>
+              </a:rPr>
+              <a:t>algoritma</a:t>
+            </a:r>
+            <a:r>
+              <a:rPr lang="en-US" sz="3500" dirty="0" smtClean="0">
+                <a:latin typeface="Cambria" pitchFamily="18" charset="0"/>
+                <a:ea typeface="Cambria" pitchFamily="18" charset="0"/>
+              </a:rPr>
+              <a:t> </a:t>
+            </a:r>
+            <a:r>
+              <a:rPr lang="en-US" sz="3500" dirty="0" err="1" smtClean="0">
+                <a:latin typeface="Cambria" pitchFamily="18" charset="0"/>
+                <a:ea typeface="Cambria" pitchFamily="18" charset="0"/>
+              </a:rPr>
+              <a:t>podaci</a:t>
+            </a:r>
+            <a:r>
+              <a:rPr lang="en-US" sz="3500" dirty="0" smtClean="0">
+                <a:latin typeface="Cambria" pitchFamily="18" charset="0"/>
+                <a:ea typeface="Cambria" pitchFamily="18" charset="0"/>
+              </a:rPr>
+              <a:t> se </a:t>
+            </a:r>
+            <a:r>
+              <a:rPr lang="en-US" sz="3500" dirty="0" err="1" smtClean="0">
+                <a:latin typeface="Cambria" pitchFamily="18" charset="0"/>
+                <a:ea typeface="Cambria" pitchFamily="18" charset="0"/>
+              </a:rPr>
+              <a:t>sastoje</a:t>
+            </a:r>
+            <a:r>
+              <a:rPr lang="en-US" sz="3500" dirty="0" smtClean="0">
+                <a:latin typeface="Cambria" pitchFamily="18" charset="0"/>
+                <a:ea typeface="Cambria" pitchFamily="18" charset="0"/>
+              </a:rPr>
+              <a:t> </a:t>
+            </a:r>
+            <a:r>
+              <a:rPr lang="en-US" sz="3500" dirty="0" err="1" smtClean="0">
+                <a:latin typeface="Cambria" pitchFamily="18" charset="0"/>
+                <a:ea typeface="Cambria" pitchFamily="18" charset="0"/>
+              </a:rPr>
+              <a:t>iz</a:t>
+            </a:r>
+            <a:r>
+              <a:rPr lang="en-US" sz="3500" dirty="0" smtClean="0">
+                <a:latin typeface="Cambria" pitchFamily="18" charset="0"/>
+                <a:ea typeface="Cambria" pitchFamily="18" charset="0"/>
+              </a:rPr>
+              <a:t> </a:t>
+            </a:r>
+            <a:r>
+              <a:rPr lang="en-US" sz="3500" dirty="0" err="1" smtClean="0">
+                <a:latin typeface="Cambria" pitchFamily="18" charset="0"/>
+                <a:ea typeface="Cambria" pitchFamily="18" charset="0"/>
+              </a:rPr>
+              <a:t>skupova</a:t>
+            </a:r>
+            <a:r>
+              <a:rPr lang="en-US" sz="3500" dirty="0" smtClean="0">
+                <a:latin typeface="Cambria" pitchFamily="18" charset="0"/>
+                <a:ea typeface="Cambria" pitchFamily="18" charset="0"/>
+              </a:rPr>
+              <a:t> </a:t>
+            </a:r>
+            <a:r>
+              <a:rPr lang="en-US" sz="3500" dirty="0" err="1" smtClean="0">
+                <a:latin typeface="Cambria" pitchFamily="18" charset="0"/>
+                <a:ea typeface="Cambria" pitchFamily="18" charset="0"/>
+              </a:rPr>
+              <a:t>za</a:t>
+            </a:r>
+            <a:r>
+              <a:rPr lang="en-US" sz="3500" dirty="0" smtClean="0">
+                <a:latin typeface="Cambria" pitchFamily="18" charset="0"/>
+                <a:ea typeface="Cambria" pitchFamily="18" charset="0"/>
+              </a:rPr>
+              <a:t> </a:t>
+            </a:r>
+            <a:r>
+              <a:rPr lang="en-US" sz="3500" dirty="0" err="1" smtClean="0">
+                <a:latin typeface="Cambria" pitchFamily="18" charset="0"/>
+                <a:ea typeface="Cambria" pitchFamily="18" charset="0"/>
+              </a:rPr>
+              <a:t>treniranje</a:t>
+            </a:r>
+            <a:r>
+              <a:rPr lang="en-US" sz="3500" dirty="0" smtClean="0">
+                <a:latin typeface="Cambria" pitchFamily="18" charset="0"/>
+                <a:ea typeface="Cambria" pitchFamily="18" charset="0"/>
+              </a:rPr>
+              <a:t> (85%) i </a:t>
+            </a:r>
+            <a:r>
+              <a:rPr lang="en-US" sz="3500" dirty="0" err="1" smtClean="0">
+                <a:latin typeface="Cambria" pitchFamily="18" charset="0"/>
+                <a:ea typeface="Cambria" pitchFamily="18" charset="0"/>
+              </a:rPr>
+              <a:t>testiranje</a:t>
+            </a:r>
+            <a:r>
+              <a:rPr lang="en-US" sz="3500" dirty="0" smtClean="0">
+                <a:latin typeface="Cambria" pitchFamily="18" charset="0"/>
+                <a:ea typeface="Cambria" pitchFamily="18" charset="0"/>
+              </a:rPr>
+              <a:t> (15%).</a:t>
             </a:r>
             <a:endParaRPr lang="en-US" sz="3500" dirty="0">
               <a:solidFill>
@@ -9142,7 +9230,7 @@
             <a:blip r:embed="rId2">
               <a:extLst>
                 <a:ext uri="{96DAC541-7B7A-43D3-8B79-37D633B846F1}">
-                  <asvg:svgBlip xmlns="" xmlns:asvg="http://schemas.microsoft.com/office/drawing/2016/SVG/main" r:embed="rId3"/>
+                  <asvg:svgBlip xmlns:asvg="http://schemas.microsoft.com/office/drawing/2016/SVG/main" xmlns="" r:embed="rId3"/>
                 </a:ext>
               </a:extLst>
             </a:blip>
@@ -9302,7 +9390,7 @@
             <a:blip r:embed="rId4">
               <a:extLst>
                 <a:ext uri="{96DAC541-7B7A-43D3-8B79-37D633B846F1}">
-                  <asvg:svgBlip xmlns="" xmlns:asvg="http://schemas.microsoft.com/office/drawing/2016/SVG/main" r:embed="rId7"/>
+                  <asvg:svgBlip xmlns:asvg="http://schemas.microsoft.com/office/drawing/2016/SVG/main" xmlns="" r:embed="rId7"/>
                 </a:ext>
               </a:extLst>
             </a:blip>
@@ -9339,19 +9427,21 @@
               </a:lnSpc>
             </a:pPr>
             <a:r>
-              <a:rPr lang="sr-Latn-RS" sz="6999" dirty="0" smtClean="0">
+              <a:rPr lang="sr-Latn-RS" sz="7200" b="1" dirty="0" smtClean="0">
                 <a:solidFill>
                   <a:srgbClr val="FFFFFF"/>
                 </a:solidFill>
-                <a:latin typeface="DM Sans Bold"/>
+                <a:latin typeface="Cambria" pitchFamily="18" charset="0"/>
+                <a:ea typeface="Cambria" pitchFamily="18" charset="0"/>
               </a:rPr>
               <a:t>Pretprocesiranje</a:t>
             </a:r>
-            <a:endParaRPr lang="en-US" sz="6999" dirty="0">
+            <a:endParaRPr lang="en-US" sz="7200" b="1" dirty="0">
               <a:solidFill>
                 <a:srgbClr val="FFFFFF"/>
               </a:solidFill>
-              <a:latin typeface="DM Sans Bold"/>
+              <a:latin typeface="Cambria" pitchFamily="18" charset="0"/>
+              <a:ea typeface="Cambria" pitchFamily="18" charset="0"/>
             </a:endParaRPr>
           </a:p>
         </p:txBody>
@@ -9527,7 +9617,7 @@
             <a:blip r:embed="rId8">
               <a:extLst>
                 <a:ext uri="{96DAC541-7B7A-43D3-8B79-37D633B846F1}">
-                  <asvg:svgBlip xmlns="" xmlns:asvg="http://schemas.microsoft.com/office/drawing/2016/SVG/main" r:embed="rId5"/>
+                  <asvg:svgBlip xmlns:asvg="http://schemas.microsoft.com/office/drawing/2016/SVG/main" xmlns="" r:embed="rId5"/>
                 </a:ext>
               </a:extLst>
             </a:blip>
@@ -9624,28 +9714,31 @@
               </a:lnSpc>
             </a:pPr>
             <a:r>
-              <a:rPr lang="sr-Latn-RS" sz="6999" dirty="0" smtClean="0">
+              <a:rPr lang="sr-Latn-RS" sz="7200" b="1" dirty="0" smtClean="0">
                 <a:solidFill>
                   <a:srgbClr val="152039"/>
                 </a:solidFill>
-                <a:latin typeface="DM Sans Bold"/>
+                <a:latin typeface="Cambria" pitchFamily="18" charset="0"/>
+                <a:ea typeface="Cambria" pitchFamily="18" charset="0"/>
               </a:rPr>
               <a:t>Metodologij</a:t>
             </a:r>
             <a:r>
-              <a:rPr lang="en-US" sz="6999" dirty="0" smtClean="0">
+              <a:rPr lang="en-US" sz="7200" b="1" dirty="0" smtClean="0">
                 <a:solidFill>
                   <a:srgbClr val="152039"/>
                 </a:solidFill>
-                <a:latin typeface="DM Sans Bold"/>
+                <a:latin typeface="Cambria" pitchFamily="18" charset="0"/>
+                <a:ea typeface="Cambria" pitchFamily="18" charset="0"/>
               </a:rPr>
               <a:t>e</a:t>
             </a:r>
-            <a:endParaRPr lang="en-US" sz="6999" dirty="0">
+            <a:endParaRPr lang="en-US" sz="7200" b="1" dirty="0">
               <a:solidFill>
                 <a:srgbClr val="152039"/>
               </a:solidFill>
-              <a:latin typeface="DM Sans Bold"/>
+              <a:latin typeface="Cambria" pitchFamily="18" charset="0"/>
+              <a:ea typeface="Cambria" pitchFamily="18" charset="0"/>
             </a:endParaRPr>
           </a:p>
         </p:txBody>
@@ -10755,7 +10848,7 @@
             <a:blip r:embed="rId3">
               <a:extLst>
                 <a:ext uri="{96DAC541-7B7A-43D3-8B79-37D633B846F1}">
-                  <asvg:svgBlip xmlns="" xmlns:asvg="http://schemas.microsoft.com/office/drawing/2016/SVG/main" r:embed="rId11"/>
+                  <asvg:svgBlip xmlns:asvg="http://schemas.microsoft.com/office/drawing/2016/SVG/main" xmlns="" r:embed="rId11"/>
                 </a:ext>
               </a:extLst>
             </a:blip>
@@ -10960,28 +11053,31 @@
               </a:lnSpc>
             </a:pPr>
             <a:r>
-              <a:rPr lang="sr-Latn-RS" sz="6999" dirty="0" smtClean="0">
+              <a:rPr lang="sr-Latn-RS" sz="7200" b="1" dirty="0" smtClean="0">
                 <a:solidFill>
                   <a:srgbClr val="152039"/>
                 </a:solidFill>
-                <a:latin typeface="DM Sans Bold"/>
+                <a:latin typeface="Cambria" pitchFamily="18" charset="0"/>
+                <a:ea typeface="Cambria" pitchFamily="18" charset="0"/>
               </a:rPr>
               <a:t>Metodologij</a:t>
             </a:r>
             <a:r>
-              <a:rPr lang="en-US" sz="6999" dirty="0" smtClean="0">
+              <a:rPr lang="en-US" sz="7200" b="1" dirty="0" smtClean="0">
                 <a:solidFill>
                   <a:srgbClr val="152039"/>
                 </a:solidFill>
-                <a:latin typeface="DM Sans Bold"/>
+                <a:latin typeface="Cambria" pitchFamily="18" charset="0"/>
+                <a:ea typeface="Cambria" pitchFamily="18" charset="0"/>
               </a:rPr>
               <a:t>e</a:t>
             </a:r>
-            <a:endParaRPr lang="en-US" sz="6999" dirty="0">
+            <a:endParaRPr lang="en-US" sz="7200" b="1" dirty="0">
               <a:solidFill>
                 <a:srgbClr val="152039"/>
               </a:solidFill>
-              <a:latin typeface="DM Sans Bold"/>
+              <a:latin typeface="Cambria" pitchFamily="18" charset="0"/>
+              <a:ea typeface="Cambria" pitchFamily="18" charset="0"/>
             </a:endParaRPr>
           </a:p>
         </p:txBody>
@@ -11012,7 +11108,42 @@
                 <a:latin typeface="Cambria" pitchFamily="18" charset="0"/>
                 <a:ea typeface="Cambria" pitchFamily="18" charset="0"/>
               </a:rPr>
-              <a:t>Pored Laplasove teoreme u metodi predict se koristi i Bajesova formula za izračunavanje verovatnoće da li je vest lažna. Koristile smo log funkciju zbog problema množenja mnogo malih brojeva što može dovesti do underflow</a:t>
+              <a:t>Pored Laplasove teoreme u metodi predict se koristi i Bajesova formula za izračunavanje verovatnoće da li je vest lažna. Koristile smo log funkciju zbog problema množenja mnogo malih brojeva </a:t>
+            </a:r>
+            <a:r>
+              <a:rPr lang="sr-Latn-RS" sz="3500" dirty="0" smtClean="0">
+                <a:latin typeface="Cambria" pitchFamily="18" charset="0"/>
+                <a:ea typeface="Cambria" pitchFamily="18" charset="0"/>
+              </a:rPr>
+              <a:t>što</a:t>
+            </a:r>
+            <a:r>
+              <a:rPr lang="en-US" sz="3500" dirty="0" smtClean="0">
+                <a:latin typeface="Cambria" pitchFamily="18" charset="0"/>
+                <a:ea typeface="Cambria" pitchFamily="18" charset="0"/>
+              </a:rPr>
+              <a:t> </a:t>
+            </a:r>
+            <a:r>
+              <a:rPr lang="en-US" sz="3500" dirty="0" err="1" smtClean="0">
+                <a:latin typeface="Cambria" pitchFamily="18" charset="0"/>
+                <a:ea typeface="Cambria" pitchFamily="18" charset="0"/>
+              </a:rPr>
+              <a:t>dovodi</a:t>
+            </a:r>
+            <a:r>
+              <a:rPr lang="sr-Latn-RS" sz="3500" dirty="0" smtClean="0">
+                <a:latin typeface="Cambria" pitchFamily="18" charset="0"/>
+                <a:ea typeface="Cambria" pitchFamily="18" charset="0"/>
+              </a:rPr>
+              <a:t> </a:t>
+            </a:r>
+            <a:r>
+              <a:rPr lang="sr-Latn-RS" sz="3500" dirty="0" smtClean="0">
+                <a:latin typeface="Cambria" pitchFamily="18" charset="0"/>
+                <a:ea typeface="Cambria" pitchFamily="18" charset="0"/>
+              </a:rPr>
+              <a:t>do underflow</a:t>
             </a:r>
             <a:r>
               <a:rPr lang="en-US" sz="3500" dirty="0" smtClean="0">
@@ -11421,7 +11552,7 @@
             <a:blip r:embed="rId3">
               <a:extLst>
                 <a:ext uri="{96DAC541-7B7A-43D3-8B79-37D633B846F1}">
-                  <asvg:svgBlip xmlns="" xmlns:asvg="http://schemas.microsoft.com/office/drawing/2016/SVG/main" r:embed="rId11"/>
+                  <asvg:svgBlip xmlns:asvg="http://schemas.microsoft.com/office/drawing/2016/SVG/main" xmlns="" r:embed="rId11"/>
                 </a:ext>
               </a:extLst>
             </a:blip>
@@ -11631,28 +11762,31 @@
               </a:lnSpc>
             </a:pPr>
             <a:r>
-              <a:rPr lang="sr-Latn-RS" sz="6999" dirty="0" smtClean="0">
+              <a:rPr lang="sr-Latn-RS" sz="7200" b="1" dirty="0" smtClean="0">
                 <a:solidFill>
                   <a:srgbClr val="152039"/>
                 </a:solidFill>
-                <a:latin typeface="DM Sans Bold"/>
+                <a:latin typeface="Cambria" pitchFamily="18" charset="0"/>
+                <a:ea typeface="Cambria" pitchFamily="18" charset="0"/>
               </a:rPr>
               <a:t>Metodologij</a:t>
             </a:r>
             <a:r>
-              <a:rPr lang="en-US" sz="6999" dirty="0" smtClean="0">
+              <a:rPr lang="en-US" sz="7200" b="1" dirty="0" smtClean="0">
                 <a:solidFill>
                   <a:srgbClr val="152039"/>
                 </a:solidFill>
-                <a:latin typeface="DM Sans Bold"/>
+                <a:latin typeface="Cambria" pitchFamily="18" charset="0"/>
+                <a:ea typeface="Cambria" pitchFamily="18" charset="0"/>
               </a:rPr>
               <a:t>e</a:t>
             </a:r>
-            <a:endParaRPr lang="en-US" sz="6999" dirty="0">
+            <a:endParaRPr lang="en-US" sz="7200" b="1" dirty="0">
               <a:solidFill>
                 <a:srgbClr val="152039"/>
               </a:solidFill>
-              <a:latin typeface="DM Sans Bold"/>
+              <a:latin typeface="Cambria" pitchFamily="18" charset="0"/>
+              <a:ea typeface="Cambria" pitchFamily="18" charset="0"/>
             </a:endParaRPr>
           </a:p>
         </p:txBody>
@@ -12224,7 +12358,21 @@
                 <a:latin typeface="Cambria" pitchFamily="18" charset="0"/>
                 <a:ea typeface="Cambria" pitchFamily="18" charset="0"/>
               </a:rPr>
-              <a:t>prosleđuje </a:t>
+              <a:t>prosleđuj</a:t>
+            </a:r>
+            <a:r>
+              <a:rPr lang="en-US" sz="3500" dirty="0" smtClean="0">
+                <a:latin typeface="Cambria" pitchFamily="18" charset="0"/>
+                <a:ea typeface="Cambria" pitchFamily="18" charset="0"/>
+              </a:rPr>
+              <a:t>u</a:t>
+            </a:r>
+            <a:r>
+              <a:rPr lang="vi-VN" sz="3500" dirty="0" smtClean="0">
+                <a:latin typeface="Cambria" pitchFamily="18" charset="0"/>
+                <a:ea typeface="Cambria" pitchFamily="18" charset="0"/>
+              </a:rPr>
+              <a:t> </a:t>
             </a:r>
             <a:r>
               <a:rPr lang="vi-VN" sz="3500" dirty="0">
@@ -12496,7 +12644,7 @@
             <a:blip r:embed="rId2">
               <a:extLst>
                 <a:ext uri="{96DAC541-7B7A-43D3-8B79-37D633B846F1}">
-                  <asvg:svgBlip xmlns="" xmlns:asvg="http://schemas.microsoft.com/office/drawing/2016/SVG/main" r:embed="rId11"/>
+                  <asvg:svgBlip xmlns:asvg="http://schemas.microsoft.com/office/drawing/2016/SVG/main" xmlns="" r:embed="rId11"/>
                 </a:ext>
               </a:extLst>
             </a:blip>
@@ -12706,28 +12854,31 @@
               </a:lnSpc>
             </a:pPr>
             <a:r>
-              <a:rPr lang="sr-Latn-RS" sz="6999" dirty="0" smtClean="0">
+              <a:rPr lang="sr-Latn-RS" sz="7200" b="1" dirty="0" smtClean="0">
                 <a:solidFill>
                   <a:srgbClr val="152039"/>
                 </a:solidFill>
-                <a:latin typeface="DM Sans Bold"/>
+                <a:latin typeface="Cambria" pitchFamily="18" charset="0"/>
+                <a:ea typeface="Cambria" pitchFamily="18" charset="0"/>
               </a:rPr>
               <a:t>Metodologij</a:t>
             </a:r>
             <a:r>
-              <a:rPr lang="en-US" sz="6999" dirty="0" smtClean="0">
+              <a:rPr lang="en-US" sz="7200" b="1" dirty="0" smtClean="0">
                 <a:solidFill>
                   <a:srgbClr val="152039"/>
                 </a:solidFill>
-                <a:latin typeface="DM Sans Bold"/>
+                <a:latin typeface="Cambria" pitchFamily="18" charset="0"/>
+                <a:ea typeface="Cambria" pitchFamily="18" charset="0"/>
               </a:rPr>
               <a:t>e</a:t>
             </a:r>
-            <a:endParaRPr lang="en-US" sz="6999" dirty="0">
+            <a:endParaRPr lang="en-US" sz="7200" b="1" dirty="0">
               <a:solidFill>
                 <a:srgbClr val="152039"/>
               </a:solidFill>
-              <a:latin typeface="DM Sans Bold"/>
+              <a:latin typeface="Cambria" pitchFamily="18" charset="0"/>
+              <a:ea typeface="Cambria" pitchFamily="18" charset="0"/>
             </a:endParaRPr>
           </a:p>
         </p:txBody>
@@ -12891,7 +13042,91 @@
                 <a:latin typeface="Cambria" pitchFamily="18" charset="0"/>
                 <a:ea typeface="Cambria" pitchFamily="18" charset="0"/>
               </a:rPr>
-              <a:t>đuju broj iteracija, learning rate i lamda param koji </a:t>
+              <a:t>đuju broj </a:t>
+            </a:r>
+            <a:r>
+              <a:rPr lang="sr-Latn-RS" sz="3500" dirty="0" smtClean="0">
+                <a:latin typeface="Cambria" pitchFamily="18" charset="0"/>
+                <a:ea typeface="Cambria" pitchFamily="18" charset="0"/>
+              </a:rPr>
+              <a:t>iteracija</a:t>
+            </a:r>
+            <a:r>
+              <a:rPr lang="en-US" sz="3500" dirty="0" smtClean="0">
+                <a:latin typeface="Cambria" pitchFamily="18" charset="0"/>
+                <a:ea typeface="Cambria" pitchFamily="18" charset="0"/>
+              </a:rPr>
+              <a:t> (90)</a:t>
+            </a:r>
+            <a:r>
+              <a:rPr lang="sr-Latn-RS" sz="3500" dirty="0" smtClean="0">
+                <a:latin typeface="Cambria" pitchFamily="18" charset="0"/>
+                <a:ea typeface="Cambria" pitchFamily="18" charset="0"/>
+              </a:rPr>
+              <a:t>, </a:t>
+            </a:r>
+            <a:r>
+              <a:rPr lang="sr-Latn-RS" sz="3500" dirty="0" smtClean="0">
+                <a:latin typeface="Cambria" pitchFamily="18" charset="0"/>
+                <a:ea typeface="Cambria" pitchFamily="18" charset="0"/>
+              </a:rPr>
+              <a:t>learning </a:t>
+            </a:r>
+            <a:r>
+              <a:rPr lang="sr-Latn-RS" sz="3500" dirty="0" smtClean="0">
+                <a:latin typeface="Cambria" pitchFamily="18" charset="0"/>
+                <a:ea typeface="Cambria" pitchFamily="18" charset="0"/>
+              </a:rPr>
+              <a:t>rate</a:t>
+            </a:r>
+            <a:r>
+              <a:rPr lang="en-US" sz="3500" dirty="0" smtClean="0">
+                <a:latin typeface="Cambria" pitchFamily="18" charset="0"/>
+                <a:ea typeface="Cambria" pitchFamily="18" charset="0"/>
+              </a:rPr>
+              <a:t> (0.001)</a:t>
+            </a:r>
+            <a:r>
+              <a:rPr lang="sr-Latn-RS" sz="3500" dirty="0" smtClean="0">
+                <a:latin typeface="Cambria" pitchFamily="18" charset="0"/>
+                <a:ea typeface="Cambria" pitchFamily="18" charset="0"/>
+              </a:rPr>
+              <a:t> </a:t>
+            </a:r>
+            <a:r>
+              <a:rPr lang="sr-Latn-RS" sz="3500" dirty="0" smtClean="0">
+                <a:latin typeface="Cambria" pitchFamily="18" charset="0"/>
+                <a:ea typeface="Cambria" pitchFamily="18" charset="0"/>
+              </a:rPr>
+              <a:t>i lamda </a:t>
+            </a:r>
+            <a:r>
+              <a:rPr lang="sr-Latn-RS" sz="3500" dirty="0" smtClean="0">
+                <a:latin typeface="Cambria" pitchFamily="18" charset="0"/>
+                <a:ea typeface="Cambria" pitchFamily="18" charset="0"/>
+              </a:rPr>
+              <a:t>param</a:t>
+            </a:r>
+            <a:r>
+              <a:rPr lang="en-US" sz="3500" dirty="0" smtClean="0">
+                <a:latin typeface="Cambria" pitchFamily="18" charset="0"/>
+                <a:ea typeface="Cambria" pitchFamily="18" charset="0"/>
+              </a:rPr>
+              <a:t> (0.001)</a:t>
+            </a:r>
+            <a:r>
+              <a:rPr lang="sr-Latn-RS" sz="3500" dirty="0" smtClean="0">
+                <a:latin typeface="Cambria" pitchFamily="18" charset="0"/>
+                <a:ea typeface="Cambria" pitchFamily="18" charset="0"/>
+              </a:rPr>
+              <a:t> </a:t>
+            </a:r>
+            <a:r>
+              <a:rPr lang="sr-Latn-RS" sz="3500" dirty="0" smtClean="0">
+                <a:latin typeface="Cambria" pitchFamily="18" charset="0"/>
+                <a:ea typeface="Cambria" pitchFamily="18" charset="0"/>
+              </a:rPr>
+              <a:t>koji </a:t>
             </a:r>
             <a:r>
               <a:rPr lang="vi-VN" sz="3500" dirty="0" smtClean="0">
@@ -13094,27 +13329,20 @@
                 <a:latin typeface="Cambria" pitchFamily="18" charset="0"/>
                 <a:ea typeface="Cambria" pitchFamily="18" charset="0"/>
               </a:rPr>
-              <a:t>. </a:t>
+              <a:t>. On se </a:t>
+            </a:r>
+            <a:r>
+              <a:rPr lang="en-US" sz="3500" dirty="0" err="1" smtClean="0">
+                <a:latin typeface="Cambria" pitchFamily="18" charset="0"/>
+                <a:ea typeface="Cambria" pitchFamily="18" charset="0"/>
+              </a:rPr>
+              <a:t>koristi</a:t>
             </a:r>
             <a:r>
               <a:rPr lang="en-US" sz="3500" dirty="0" smtClean="0">
                 <a:latin typeface="Cambria" pitchFamily="18" charset="0"/>
                 <a:ea typeface="Cambria" pitchFamily="18" charset="0"/>
               </a:rPr>
-              <a:t>On se </a:t>
-            </a:r>
-            <a:r>
-              <a:rPr lang="en-US" sz="3500" dirty="0" err="1" smtClean="0">
-                <a:latin typeface="Cambria" pitchFamily="18" charset="0"/>
-                <a:ea typeface="Cambria" pitchFamily="18" charset="0"/>
-              </a:rPr>
-              <a:t>koristi</a:t>
-            </a:r>
-            <a:r>
-              <a:rPr lang="en-US" sz="3500" dirty="0" smtClean="0">
-                <a:latin typeface="Cambria" pitchFamily="18" charset="0"/>
-                <a:ea typeface="Cambria" pitchFamily="18" charset="0"/>
-              </a:rPr>
               <a:t> da bi </a:t>
             </a:r>
             <a:r>
@@ -13122,14 +13350,7 @@
                 <a:latin typeface="Cambria" pitchFamily="18" charset="0"/>
                 <a:ea typeface="Cambria" pitchFamily="18" charset="0"/>
               </a:rPr>
-              <a:t>se </a:t>
-            </a:r>
-            <a:r>
-              <a:rPr lang="vi-VN" sz="3500" dirty="0" smtClean="0">
-                <a:latin typeface="Cambria" pitchFamily="18" charset="0"/>
-                <a:ea typeface="Cambria" pitchFamily="18" charset="0"/>
-              </a:rPr>
-              <a:t>poveća</a:t>
+              <a:t>se poveća</a:t>
             </a:r>
             <a:r>
               <a:rPr lang="en-US" sz="3500" dirty="0" smtClean="0">
@@ -13513,7 +13734,7 @@
             <a:blip r:embed="rId2">
               <a:extLst>
                 <a:ext uri="{96DAC541-7B7A-43D3-8B79-37D633B846F1}">
-                  <asvg:svgBlip xmlns="" xmlns:asvg="http://schemas.microsoft.com/office/drawing/2016/SVG/main" r:embed="rId11"/>
+                  <asvg:svgBlip xmlns:asvg="http://schemas.microsoft.com/office/drawing/2016/SVG/main" xmlns="" r:embed="rId11"/>
                 </a:ext>
               </a:extLst>
             </a:blip>
@@ -13723,28 +13944,31 @@
               </a:lnSpc>
             </a:pPr>
             <a:r>
-              <a:rPr lang="sr-Latn-RS" sz="6999" dirty="0" smtClean="0">
+              <a:rPr lang="sr-Latn-RS" sz="7200" b="1" dirty="0" smtClean="0">
                 <a:solidFill>
                   <a:srgbClr val="152039"/>
                 </a:solidFill>
-                <a:latin typeface="DM Sans Bold"/>
+                <a:latin typeface="Cambria" pitchFamily="18" charset="0"/>
+                <a:ea typeface="Cambria" pitchFamily="18" charset="0"/>
               </a:rPr>
               <a:t>Metodologij</a:t>
             </a:r>
             <a:r>
-              <a:rPr lang="en-US" sz="6999" dirty="0" smtClean="0">
+              <a:rPr lang="en-US" sz="7200" b="1" dirty="0" smtClean="0">
                 <a:solidFill>
                   <a:srgbClr val="152039"/>
                 </a:solidFill>
-                <a:latin typeface="DM Sans Bold"/>
+                <a:latin typeface="Cambria" pitchFamily="18" charset="0"/>
+                <a:ea typeface="Cambria" pitchFamily="18" charset="0"/>
               </a:rPr>
               <a:t>e</a:t>
             </a:r>
-            <a:endParaRPr lang="en-US" sz="6999" dirty="0">
+            <a:endParaRPr lang="en-US" sz="7200" b="1" dirty="0">
               <a:solidFill>
                 <a:srgbClr val="152039"/>
               </a:solidFill>
-              <a:latin typeface="DM Sans Bold"/>
+              <a:latin typeface="Cambria" pitchFamily="18" charset="0"/>
+              <a:ea typeface="Cambria" pitchFamily="18" charset="0"/>
             </a:endParaRPr>
           </a:p>
         </p:txBody>
@@ -13796,7 +14020,28 @@
                 <a:latin typeface="Cambria" pitchFamily="18" charset="0"/>
                 <a:ea typeface="Cambria" pitchFamily="18" charset="0"/>
               </a:rPr>
-              <a:t>(100) </a:t>
+              <a:t>(</a:t>
+            </a:r>
+            <a:r>
+              <a:rPr lang="en-US" sz="3500" dirty="0">
+                <a:latin typeface="Cambria" pitchFamily="18" charset="0"/>
+                <a:ea typeface="Cambria" pitchFamily="18" charset="0"/>
+              </a:rPr>
+              <a:t>9</a:t>
+            </a:r>
+            <a:r>
+              <a:rPr lang="sr-Latn-RS" sz="3500" dirty="0" smtClean="0">
+                <a:latin typeface="Cambria" pitchFamily="18" charset="0"/>
+                <a:ea typeface="Cambria" pitchFamily="18" charset="0"/>
+              </a:rPr>
+              <a:t>0</a:t>
+            </a:r>
+            <a:r>
+              <a:rPr lang="sr-Latn-RS" sz="3500" dirty="0" smtClean="0">
+                <a:latin typeface="Cambria" pitchFamily="18" charset="0"/>
+                <a:ea typeface="Cambria" pitchFamily="18" charset="0"/>
+              </a:rPr>
+              <a:t>) </a:t>
             </a:r>
             <a:r>
               <a:rPr lang="vi-VN" sz="3500" dirty="0" smtClean="0">
@@ -13845,7 +14090,21 @@
                 <a:latin typeface="Cambria" pitchFamily="18" charset="0"/>
                 <a:ea typeface="Cambria" pitchFamily="18" charset="0"/>
               </a:rPr>
-              <a:t>model samo ažurira težine u skladu sa regularizacijom, dok se za primere </a:t>
+              <a:t>model </a:t>
+            </a:r>
+            <a:r>
+              <a:rPr lang="vi-VN" sz="3500" dirty="0" smtClean="0">
+                <a:latin typeface="Cambria" pitchFamily="18" charset="0"/>
+                <a:ea typeface="Cambria" pitchFamily="18" charset="0"/>
+              </a:rPr>
+              <a:t>ažurira </a:t>
+            </a:r>
+            <a:r>
+              <a:rPr lang="vi-VN" sz="3500" dirty="0">
+                <a:latin typeface="Cambria" pitchFamily="18" charset="0"/>
+                <a:ea typeface="Cambria" pitchFamily="18" charset="0"/>
+              </a:rPr>
+              <a:t>težine u skladu sa regularizacijom, dok se za primere </a:t>
             </a:r>
             <a:r>
               <a:rPr lang="vi-VN" sz="3500" dirty="0" smtClean="0">
@@ -14243,7 +14502,7 @@
             <a:blip r:embed="rId2">
               <a:extLst>
                 <a:ext uri="{96DAC541-7B7A-43D3-8B79-37D633B846F1}">
-                  <asvg:svgBlip xmlns="" xmlns:asvg="http://schemas.microsoft.com/office/drawing/2016/SVG/main" r:embed="rId11"/>
+                  <asvg:svgBlip xmlns:asvg="http://schemas.microsoft.com/office/drawing/2016/SVG/main" xmlns="" r:embed="rId11"/>
                 </a:ext>
               </a:extLst>
             </a:blip>

</xml_diff>